<commit_message>
Actualización FINAL de documentos
...
</commit_message>
<xml_diff>
--- a/Documentos/Autómata Switch.pptx
+++ b/Documentos/Autómata Switch.pptx
@@ -2,13 +2,15 @@
 <file path=ppt/presentation.xml><?xml version="1.0" encoding="utf-8"?>
 <p:presentation xmlns:a="http://schemas.openxmlformats.org/drawingml/2006/main" xmlns:r="http://schemas.openxmlformats.org/officeDocument/2006/relationships" xmlns:p="http://schemas.openxmlformats.org/presentationml/2006/main" saveSubsetFonts="1">
   <p:sldMasterIdLst>
-    <p:sldMasterId id="2147483648" r:id="rId1"/>
+    <p:sldMasterId id="2147483678" r:id="rId1"/>
   </p:sldMasterIdLst>
   <p:notesMasterIdLst>
-    <p:notesMasterId r:id="rId3"/>
+    <p:notesMasterId r:id="rId5"/>
   </p:notesMasterIdLst>
   <p:sldIdLst>
-    <p:sldId id="256" r:id="rId2"/>
+    <p:sldId id="258" r:id="rId2"/>
+    <p:sldId id="256" r:id="rId3"/>
+    <p:sldId id="257" r:id="rId4"/>
   </p:sldIdLst>
   <p:sldSz cx="12192000" cy="6858000"/>
   <p:notesSz cx="6858000" cy="9144000"/>
@@ -115,6 +117,10 @@
 </p:presentation>
 </file>
 
+<file path=ppt/revisionInfo.xml><?xml version="1.0" encoding="utf-8"?>
+<p1510:revInfo xmlns:a="http://schemas.openxmlformats.org/drawingml/2006/main" xmlns:r="http://schemas.openxmlformats.org/officeDocument/2006/relationships" xmlns:p1510="http://schemas.microsoft.com/office/powerpoint/2015/10/main"/>
+</file>
+
 <file path=ppt/notesMasters/notesMaster1.xml><?xml version="1.0" encoding="utf-8"?>
 <p:notesMaster xmlns:a="http://schemas.openxmlformats.org/drawingml/2006/main" xmlns:r="http://schemas.openxmlformats.org/officeDocument/2006/relationships" xmlns:p="http://schemas.openxmlformats.org/presentationml/2006/main">
   <p:cSld>
@@ -197,7 +203,7 @@
           <a:p>
             <a:fld id="{62DE766B-4804-4B4D-969E-8933CFD5E60A}" type="datetimeFigureOut">
               <a:rPr lang="es-MX" smtClean="0"/>
-              <a:t>01/02/2018</a:t>
+              <a:t>02/02/2018</a:t>
             </a:fld>
             <a:endParaRPr lang="es-MX"/>
           </a:p>
@@ -530,7 +536,7 @@
           <a:p>
             <a:fld id="{CB3AD7B1-65F0-4C35-B1AD-FE6CF0089559}" type="slidenum">
               <a:rPr lang="es-MX" smtClean="0"/>
-              <a:t>1</a:t>
+              <a:t>2</a:t>
             </a:fld>
             <a:endParaRPr lang="es-MX"/>
           </a:p>
@@ -571,7 +577,7 @@
           <p:cNvPr id="2" name="Título 1">
             <a:extLst>
               <a:ext uri="{FF2B5EF4-FFF2-40B4-BE49-F238E27FC236}">
-                <a16:creationId xmlns:a16="http://schemas.microsoft.com/office/drawing/2014/main" id="{0D33149C-4A53-44F2-B106-8A083C8E8540}"/>
+                <a16:creationId xmlns:a16="http://schemas.microsoft.com/office/drawing/2014/main" id="{F7E38E5B-5617-4F5A-B2EB-F79D30D54AFE}"/>
               </a:ext>
             </a:extLst>
           </p:cNvPr>
@@ -609,7 +615,7 @@
           <p:cNvPr id="3" name="Subtítulo 2">
             <a:extLst>
               <a:ext uri="{FF2B5EF4-FFF2-40B4-BE49-F238E27FC236}">
-                <a16:creationId xmlns:a16="http://schemas.microsoft.com/office/drawing/2014/main" id="{5D7D48B0-7CF1-489A-B4FF-111A3020CEDE}"/>
+                <a16:creationId xmlns:a16="http://schemas.microsoft.com/office/drawing/2014/main" id="{23855610-A053-40B2-B447-12A2C7650D11}"/>
               </a:ext>
             </a:extLst>
           </p:cNvPr>
@@ -680,7 +686,7 @@
           <p:cNvPr id="4" name="Marcador de fecha 3">
             <a:extLst>
               <a:ext uri="{FF2B5EF4-FFF2-40B4-BE49-F238E27FC236}">
-                <a16:creationId xmlns:a16="http://schemas.microsoft.com/office/drawing/2014/main" id="{5814BF26-6C1E-4634-9DA8-67234681000C}"/>
+                <a16:creationId xmlns:a16="http://schemas.microsoft.com/office/drawing/2014/main" id="{45115573-131F-4316-8AF2-CE25916FCE2A}"/>
               </a:ext>
             </a:extLst>
           </p:cNvPr>
@@ -708,7 +714,7 @@
           <p:cNvPr id="5" name="Marcador de pie de página 4">
             <a:extLst>
               <a:ext uri="{FF2B5EF4-FFF2-40B4-BE49-F238E27FC236}">
-                <a16:creationId xmlns:a16="http://schemas.microsoft.com/office/drawing/2014/main" id="{390E4784-CCDC-4E64-9EA3-AC5B7DF61A05}"/>
+                <a16:creationId xmlns:a16="http://schemas.microsoft.com/office/drawing/2014/main" id="{75DEBFB8-3A7F-4132-A7C4-2E2E3B390252}"/>
               </a:ext>
             </a:extLst>
           </p:cNvPr>
@@ -736,7 +742,7 @@
           <p:cNvPr id="6" name="Marcador de número de diapositiva 5">
             <a:extLst>
               <a:ext uri="{FF2B5EF4-FFF2-40B4-BE49-F238E27FC236}">
-                <a16:creationId xmlns:a16="http://schemas.microsoft.com/office/drawing/2014/main" id="{81C3BFB3-ACBD-4B8F-8EC9-08100140B109}"/>
+                <a16:creationId xmlns:a16="http://schemas.microsoft.com/office/drawing/2014/main" id="{D1980BE6-DAE7-4102-99F4-54DC2025CA32}"/>
               </a:ext>
             </a:extLst>
           </p:cNvPr>
@@ -763,7 +769,7 @@
     </p:spTree>
     <p:extLst>
       <p:ext uri="{BB962C8B-B14F-4D97-AF65-F5344CB8AC3E}">
-        <p14:creationId xmlns:p14="http://schemas.microsoft.com/office/powerpoint/2010/main" val="952554907"/>
+        <p14:creationId xmlns:p14="http://schemas.microsoft.com/office/powerpoint/2010/main" val="2045462774"/>
       </p:ext>
     </p:extLst>
   </p:cSld>
@@ -795,7 +801,7 @@
           <p:cNvPr id="2" name="Título 1">
             <a:extLst>
               <a:ext uri="{FF2B5EF4-FFF2-40B4-BE49-F238E27FC236}">
-                <a16:creationId xmlns:a16="http://schemas.microsoft.com/office/drawing/2014/main" id="{C6D8D581-A28C-4A95-942B-66E95728631B}"/>
+                <a16:creationId xmlns:a16="http://schemas.microsoft.com/office/drawing/2014/main" id="{31DB0F13-2703-41CD-BB64-F484BC8DCCE1}"/>
               </a:ext>
             </a:extLst>
           </p:cNvPr>
@@ -824,7 +830,7 @@
           <p:cNvPr id="3" name="Marcador de texto vertical 2">
             <a:extLst>
               <a:ext uri="{FF2B5EF4-FFF2-40B4-BE49-F238E27FC236}">
-                <a16:creationId xmlns:a16="http://schemas.microsoft.com/office/drawing/2014/main" id="{6FEA3B02-346D-4E55-9C38-1CA081EB7F09}"/>
+                <a16:creationId xmlns:a16="http://schemas.microsoft.com/office/drawing/2014/main" id="{91AF1090-7759-41A4-BA0C-FB09FD2A8E68}"/>
               </a:ext>
             </a:extLst>
           </p:cNvPr>
@@ -882,7 +888,7 @@
           <p:cNvPr id="4" name="Marcador de fecha 3">
             <a:extLst>
               <a:ext uri="{FF2B5EF4-FFF2-40B4-BE49-F238E27FC236}">
-                <a16:creationId xmlns:a16="http://schemas.microsoft.com/office/drawing/2014/main" id="{A4183988-D47D-40E3-8254-561725D3CBE8}"/>
+                <a16:creationId xmlns:a16="http://schemas.microsoft.com/office/drawing/2014/main" id="{AE720D57-7A9D-4937-8006-AA6E701BFE7A}"/>
               </a:ext>
             </a:extLst>
           </p:cNvPr>
@@ -910,7 +916,7 @@
           <p:cNvPr id="5" name="Marcador de pie de página 4">
             <a:extLst>
               <a:ext uri="{FF2B5EF4-FFF2-40B4-BE49-F238E27FC236}">
-                <a16:creationId xmlns:a16="http://schemas.microsoft.com/office/drawing/2014/main" id="{A2EBBE06-89FE-48D3-8A20-545A3A5276F3}"/>
+                <a16:creationId xmlns:a16="http://schemas.microsoft.com/office/drawing/2014/main" id="{622414FB-B271-4A1C-8FFB-B92088AC1F5F}"/>
               </a:ext>
             </a:extLst>
           </p:cNvPr>
@@ -938,7 +944,7 @@
           <p:cNvPr id="6" name="Marcador de número de diapositiva 5">
             <a:extLst>
               <a:ext uri="{FF2B5EF4-FFF2-40B4-BE49-F238E27FC236}">
-                <a16:creationId xmlns:a16="http://schemas.microsoft.com/office/drawing/2014/main" id="{370F7D1D-E273-4C5E-BC4A-A297D389EE2F}"/>
+                <a16:creationId xmlns:a16="http://schemas.microsoft.com/office/drawing/2014/main" id="{DFABF6F2-1AD6-49A3-8CE5-E812405CC3C9}"/>
               </a:ext>
             </a:extLst>
           </p:cNvPr>
@@ -965,7 +971,7 @@
     </p:spTree>
     <p:extLst>
       <p:ext uri="{BB962C8B-B14F-4D97-AF65-F5344CB8AC3E}">
-        <p14:creationId xmlns:p14="http://schemas.microsoft.com/office/powerpoint/2010/main" val="799715410"/>
+        <p14:creationId xmlns:p14="http://schemas.microsoft.com/office/powerpoint/2010/main" val="1699458096"/>
       </p:ext>
     </p:extLst>
   </p:cSld>
@@ -997,7 +1003,7 @@
           <p:cNvPr id="2" name="Título vertical 1">
             <a:extLst>
               <a:ext uri="{FF2B5EF4-FFF2-40B4-BE49-F238E27FC236}">
-                <a16:creationId xmlns:a16="http://schemas.microsoft.com/office/drawing/2014/main" id="{DE6E6E52-8833-4C38-AA6B-788FE63839FB}"/>
+                <a16:creationId xmlns:a16="http://schemas.microsoft.com/office/drawing/2014/main" id="{8A1B17EF-CC8E-4FC5-A61A-3C506E491886}"/>
               </a:ext>
             </a:extLst>
           </p:cNvPr>
@@ -1031,7 +1037,7 @@
           <p:cNvPr id="3" name="Marcador de texto vertical 2">
             <a:extLst>
               <a:ext uri="{FF2B5EF4-FFF2-40B4-BE49-F238E27FC236}">
-                <a16:creationId xmlns:a16="http://schemas.microsoft.com/office/drawing/2014/main" id="{862E644A-18F9-46A0-9F53-0676DD27B88F}"/>
+                <a16:creationId xmlns:a16="http://schemas.microsoft.com/office/drawing/2014/main" id="{453DEE3E-D404-472C-A8E7-78089AB147CA}"/>
               </a:ext>
             </a:extLst>
           </p:cNvPr>
@@ -1094,7 +1100,7 @@
           <p:cNvPr id="4" name="Marcador de fecha 3">
             <a:extLst>
               <a:ext uri="{FF2B5EF4-FFF2-40B4-BE49-F238E27FC236}">
-                <a16:creationId xmlns:a16="http://schemas.microsoft.com/office/drawing/2014/main" id="{59F94E87-4700-45B0-94F0-A94C89ABA800}"/>
+                <a16:creationId xmlns:a16="http://schemas.microsoft.com/office/drawing/2014/main" id="{8D5CE046-8CBF-4731-BA46-158DD53CA1C6}"/>
               </a:ext>
             </a:extLst>
           </p:cNvPr>
@@ -1122,7 +1128,7 @@
           <p:cNvPr id="5" name="Marcador de pie de página 4">
             <a:extLst>
               <a:ext uri="{FF2B5EF4-FFF2-40B4-BE49-F238E27FC236}">
-                <a16:creationId xmlns:a16="http://schemas.microsoft.com/office/drawing/2014/main" id="{45ED4A78-F5E7-46B8-B169-3925EFE71755}"/>
+                <a16:creationId xmlns:a16="http://schemas.microsoft.com/office/drawing/2014/main" id="{752A210D-C5BF-421E-870F-4E13B355186B}"/>
               </a:ext>
             </a:extLst>
           </p:cNvPr>
@@ -1150,7 +1156,7 @@
           <p:cNvPr id="6" name="Marcador de número de diapositiva 5">
             <a:extLst>
               <a:ext uri="{FF2B5EF4-FFF2-40B4-BE49-F238E27FC236}">
-                <a16:creationId xmlns:a16="http://schemas.microsoft.com/office/drawing/2014/main" id="{60DCEB2F-13D4-49AC-B3DA-330095606220}"/>
+                <a16:creationId xmlns:a16="http://schemas.microsoft.com/office/drawing/2014/main" id="{78827E19-2951-448A-902A-D9C462C4BCBD}"/>
               </a:ext>
             </a:extLst>
           </p:cNvPr>
@@ -1177,7 +1183,7 @@
     </p:spTree>
     <p:extLst>
       <p:ext uri="{BB962C8B-B14F-4D97-AF65-F5344CB8AC3E}">
-        <p14:creationId xmlns:p14="http://schemas.microsoft.com/office/powerpoint/2010/main" val="4036863935"/>
+        <p14:creationId xmlns:p14="http://schemas.microsoft.com/office/powerpoint/2010/main" val="400126890"/>
       </p:ext>
     </p:extLst>
   </p:cSld>
@@ -1209,7 +1215,7 @@
           <p:cNvPr id="2" name="Título 1">
             <a:extLst>
               <a:ext uri="{FF2B5EF4-FFF2-40B4-BE49-F238E27FC236}">
-                <a16:creationId xmlns:a16="http://schemas.microsoft.com/office/drawing/2014/main" id="{BCE217EA-C624-467B-8979-158332A21301}"/>
+                <a16:creationId xmlns:a16="http://schemas.microsoft.com/office/drawing/2014/main" id="{6ADBF6D7-D7B6-4B50-838F-5C09D68D97BE}"/>
               </a:ext>
             </a:extLst>
           </p:cNvPr>
@@ -1238,7 +1244,7 @@
           <p:cNvPr id="3" name="Marcador de contenido 2">
             <a:extLst>
               <a:ext uri="{FF2B5EF4-FFF2-40B4-BE49-F238E27FC236}">
-                <a16:creationId xmlns:a16="http://schemas.microsoft.com/office/drawing/2014/main" id="{1E9462AB-A372-4FE5-BD99-5006F7AED3B1}"/>
+                <a16:creationId xmlns:a16="http://schemas.microsoft.com/office/drawing/2014/main" id="{D4C4F14E-0F11-4CB4-92EA-F386CFFA6F7B}"/>
               </a:ext>
             </a:extLst>
           </p:cNvPr>
@@ -1296,7 +1302,7 @@
           <p:cNvPr id="4" name="Marcador de fecha 3">
             <a:extLst>
               <a:ext uri="{FF2B5EF4-FFF2-40B4-BE49-F238E27FC236}">
-                <a16:creationId xmlns:a16="http://schemas.microsoft.com/office/drawing/2014/main" id="{C1D6822D-5855-4A8A-B2E5-1C30C08CA948}"/>
+                <a16:creationId xmlns:a16="http://schemas.microsoft.com/office/drawing/2014/main" id="{2321A76E-00EE-4B6C-AC52-E9ABE8C414A9}"/>
               </a:ext>
             </a:extLst>
           </p:cNvPr>
@@ -1324,7 +1330,7 @@
           <p:cNvPr id="5" name="Marcador de pie de página 4">
             <a:extLst>
               <a:ext uri="{FF2B5EF4-FFF2-40B4-BE49-F238E27FC236}">
-                <a16:creationId xmlns:a16="http://schemas.microsoft.com/office/drawing/2014/main" id="{0E1E7EE4-ED3F-4512-9283-EE73C31F740C}"/>
+                <a16:creationId xmlns:a16="http://schemas.microsoft.com/office/drawing/2014/main" id="{9C417788-5F3F-4D54-9A96-4DB2D5C7F3BA}"/>
               </a:ext>
             </a:extLst>
           </p:cNvPr>
@@ -1352,7 +1358,7 @@
           <p:cNvPr id="6" name="Marcador de número de diapositiva 5">
             <a:extLst>
               <a:ext uri="{FF2B5EF4-FFF2-40B4-BE49-F238E27FC236}">
-                <a16:creationId xmlns:a16="http://schemas.microsoft.com/office/drawing/2014/main" id="{ABD40929-5175-43B1-954D-9B3160C59A25}"/>
+                <a16:creationId xmlns:a16="http://schemas.microsoft.com/office/drawing/2014/main" id="{1B1CADCD-1192-4150-AC48-44C59ACE7431}"/>
               </a:ext>
             </a:extLst>
           </p:cNvPr>
@@ -1379,7 +1385,7 @@
     </p:spTree>
     <p:extLst>
       <p:ext uri="{BB962C8B-B14F-4D97-AF65-F5344CB8AC3E}">
-        <p14:creationId xmlns:p14="http://schemas.microsoft.com/office/powerpoint/2010/main" val="4082066862"/>
+        <p14:creationId xmlns:p14="http://schemas.microsoft.com/office/powerpoint/2010/main" val="949483516"/>
       </p:ext>
     </p:extLst>
   </p:cSld>
@@ -1411,7 +1417,7 @@
           <p:cNvPr id="2" name="Título 1">
             <a:extLst>
               <a:ext uri="{FF2B5EF4-FFF2-40B4-BE49-F238E27FC236}">
-                <a16:creationId xmlns:a16="http://schemas.microsoft.com/office/drawing/2014/main" id="{58F57AC0-9391-4419-9FF4-9461A5DF29D1}"/>
+                <a16:creationId xmlns:a16="http://schemas.microsoft.com/office/drawing/2014/main" id="{D364BE82-5E72-4754-AFE5-8164A8C462ED}"/>
               </a:ext>
             </a:extLst>
           </p:cNvPr>
@@ -1449,7 +1455,7 @@
           <p:cNvPr id="3" name="Marcador de texto 2">
             <a:extLst>
               <a:ext uri="{FF2B5EF4-FFF2-40B4-BE49-F238E27FC236}">
-                <a16:creationId xmlns:a16="http://schemas.microsoft.com/office/drawing/2014/main" id="{8773E09A-26CF-44D5-BA9B-0D7498478CDF}"/>
+                <a16:creationId xmlns:a16="http://schemas.microsoft.com/office/drawing/2014/main" id="{8E34C2BF-756B-4DC0-BFAA-B2524C59E5F6}"/>
               </a:ext>
             </a:extLst>
           </p:cNvPr>
@@ -1574,7 +1580,7 @@
           <p:cNvPr id="4" name="Marcador de fecha 3">
             <a:extLst>
               <a:ext uri="{FF2B5EF4-FFF2-40B4-BE49-F238E27FC236}">
-                <a16:creationId xmlns:a16="http://schemas.microsoft.com/office/drawing/2014/main" id="{2788D2C9-A8AD-477E-BE22-A18DE340B14C}"/>
+                <a16:creationId xmlns:a16="http://schemas.microsoft.com/office/drawing/2014/main" id="{4A85239A-50CD-47BF-BF88-049821BBC4F7}"/>
               </a:ext>
             </a:extLst>
           </p:cNvPr>
@@ -1602,7 +1608,7 @@
           <p:cNvPr id="5" name="Marcador de pie de página 4">
             <a:extLst>
               <a:ext uri="{FF2B5EF4-FFF2-40B4-BE49-F238E27FC236}">
-                <a16:creationId xmlns:a16="http://schemas.microsoft.com/office/drawing/2014/main" id="{5202434F-5CA8-4F89-9F1A-2552B836F8BD}"/>
+                <a16:creationId xmlns:a16="http://schemas.microsoft.com/office/drawing/2014/main" id="{A11908CC-A97F-41EB-BA1C-803AA55260C9}"/>
               </a:ext>
             </a:extLst>
           </p:cNvPr>
@@ -1630,7 +1636,7 @@
           <p:cNvPr id="6" name="Marcador de número de diapositiva 5">
             <a:extLst>
               <a:ext uri="{FF2B5EF4-FFF2-40B4-BE49-F238E27FC236}">
-                <a16:creationId xmlns:a16="http://schemas.microsoft.com/office/drawing/2014/main" id="{DCC92DFB-AE10-4E15-A5D3-4455A1DD25B9}"/>
+                <a16:creationId xmlns:a16="http://schemas.microsoft.com/office/drawing/2014/main" id="{BD296976-1F39-4C96-9FF0-F4EAE4E2B521}"/>
               </a:ext>
             </a:extLst>
           </p:cNvPr>
@@ -1657,7 +1663,7 @@
     </p:spTree>
     <p:extLst>
       <p:ext uri="{BB962C8B-B14F-4D97-AF65-F5344CB8AC3E}">
-        <p14:creationId xmlns:p14="http://schemas.microsoft.com/office/powerpoint/2010/main" val="4030642724"/>
+        <p14:creationId xmlns:p14="http://schemas.microsoft.com/office/powerpoint/2010/main" val="3952644249"/>
       </p:ext>
     </p:extLst>
   </p:cSld>
@@ -1689,7 +1695,7 @@
           <p:cNvPr id="2" name="Título 1">
             <a:extLst>
               <a:ext uri="{FF2B5EF4-FFF2-40B4-BE49-F238E27FC236}">
-                <a16:creationId xmlns:a16="http://schemas.microsoft.com/office/drawing/2014/main" id="{757D17E8-2244-4C0E-94DE-09F5B0519EBD}"/>
+                <a16:creationId xmlns:a16="http://schemas.microsoft.com/office/drawing/2014/main" id="{31F41D86-FC3E-4DF2-9791-15C69CA653BE}"/>
               </a:ext>
             </a:extLst>
           </p:cNvPr>
@@ -1718,7 +1724,7 @@
           <p:cNvPr id="3" name="Marcador de contenido 2">
             <a:extLst>
               <a:ext uri="{FF2B5EF4-FFF2-40B4-BE49-F238E27FC236}">
-                <a16:creationId xmlns:a16="http://schemas.microsoft.com/office/drawing/2014/main" id="{245C5DEB-909E-4291-BF5C-F071137E517F}"/>
+                <a16:creationId xmlns:a16="http://schemas.microsoft.com/office/drawing/2014/main" id="{967423A2-D552-4762-9D96-1B3B143F4F8F}"/>
               </a:ext>
             </a:extLst>
           </p:cNvPr>
@@ -1781,7 +1787,7 @@
           <p:cNvPr id="4" name="Marcador de contenido 3">
             <a:extLst>
               <a:ext uri="{FF2B5EF4-FFF2-40B4-BE49-F238E27FC236}">
-                <a16:creationId xmlns:a16="http://schemas.microsoft.com/office/drawing/2014/main" id="{962C8D78-705D-4659-AD37-295BA82B89EF}"/>
+                <a16:creationId xmlns:a16="http://schemas.microsoft.com/office/drawing/2014/main" id="{E0A9C5A5-C9F8-4290-8563-096300F462B2}"/>
               </a:ext>
             </a:extLst>
           </p:cNvPr>
@@ -1844,7 +1850,7 @@
           <p:cNvPr id="5" name="Marcador de fecha 4">
             <a:extLst>
               <a:ext uri="{FF2B5EF4-FFF2-40B4-BE49-F238E27FC236}">
-                <a16:creationId xmlns:a16="http://schemas.microsoft.com/office/drawing/2014/main" id="{18BC57A5-A93F-4D9B-A5D0-46191A6CBF78}"/>
+                <a16:creationId xmlns:a16="http://schemas.microsoft.com/office/drawing/2014/main" id="{194BD2E4-0295-41A6-B86A-FA52BBA575F4}"/>
               </a:ext>
             </a:extLst>
           </p:cNvPr>
@@ -1872,7 +1878,7 @@
           <p:cNvPr id="6" name="Marcador de pie de página 5">
             <a:extLst>
               <a:ext uri="{FF2B5EF4-FFF2-40B4-BE49-F238E27FC236}">
-                <a16:creationId xmlns:a16="http://schemas.microsoft.com/office/drawing/2014/main" id="{FDFCE6BF-3968-46BE-AB8D-A28447CE0C89}"/>
+                <a16:creationId xmlns:a16="http://schemas.microsoft.com/office/drawing/2014/main" id="{C3482D2A-A5E4-41B0-B33C-1B946D8EAD50}"/>
               </a:ext>
             </a:extLst>
           </p:cNvPr>
@@ -1900,7 +1906,7 @@
           <p:cNvPr id="7" name="Marcador de número de diapositiva 6">
             <a:extLst>
               <a:ext uri="{FF2B5EF4-FFF2-40B4-BE49-F238E27FC236}">
-                <a16:creationId xmlns:a16="http://schemas.microsoft.com/office/drawing/2014/main" id="{F01D23F7-FDFC-443A-84E0-67B1244272AB}"/>
+                <a16:creationId xmlns:a16="http://schemas.microsoft.com/office/drawing/2014/main" id="{4450F7C3-3099-4B9B-9D3B-497AD261F524}"/>
               </a:ext>
             </a:extLst>
           </p:cNvPr>
@@ -1927,7 +1933,7 @@
     </p:spTree>
     <p:extLst>
       <p:ext uri="{BB962C8B-B14F-4D97-AF65-F5344CB8AC3E}">
-        <p14:creationId xmlns:p14="http://schemas.microsoft.com/office/powerpoint/2010/main" val="3709950663"/>
+        <p14:creationId xmlns:p14="http://schemas.microsoft.com/office/powerpoint/2010/main" val="3325125790"/>
       </p:ext>
     </p:extLst>
   </p:cSld>
@@ -1959,7 +1965,7 @@
           <p:cNvPr id="2" name="Título 1">
             <a:extLst>
               <a:ext uri="{FF2B5EF4-FFF2-40B4-BE49-F238E27FC236}">
-                <a16:creationId xmlns:a16="http://schemas.microsoft.com/office/drawing/2014/main" id="{9008995B-35ED-49B0-9235-8DC55CAC103E}"/>
+                <a16:creationId xmlns:a16="http://schemas.microsoft.com/office/drawing/2014/main" id="{AF571D28-5751-40C2-B2BA-58C70B0BE221}"/>
               </a:ext>
             </a:extLst>
           </p:cNvPr>
@@ -1993,7 +1999,7 @@
           <p:cNvPr id="3" name="Marcador de texto 2">
             <a:extLst>
               <a:ext uri="{FF2B5EF4-FFF2-40B4-BE49-F238E27FC236}">
-                <a16:creationId xmlns:a16="http://schemas.microsoft.com/office/drawing/2014/main" id="{65518A7D-483F-4E8F-8E21-345414D2E6A7}"/>
+                <a16:creationId xmlns:a16="http://schemas.microsoft.com/office/drawing/2014/main" id="{5FD01A43-8E8F-424C-BE64-F114B567F43B}"/>
               </a:ext>
             </a:extLst>
           </p:cNvPr>
@@ -2064,7 +2070,7 @@
           <p:cNvPr id="4" name="Marcador de contenido 3">
             <a:extLst>
               <a:ext uri="{FF2B5EF4-FFF2-40B4-BE49-F238E27FC236}">
-                <a16:creationId xmlns:a16="http://schemas.microsoft.com/office/drawing/2014/main" id="{FC1B8AD0-2271-4D3E-BA54-A1D8DDC8F105}"/>
+                <a16:creationId xmlns:a16="http://schemas.microsoft.com/office/drawing/2014/main" id="{78AC130D-F78D-480D-8735-D3A9E94BD568}"/>
               </a:ext>
             </a:extLst>
           </p:cNvPr>
@@ -2127,7 +2133,7 @@
           <p:cNvPr id="5" name="Marcador de texto 4">
             <a:extLst>
               <a:ext uri="{FF2B5EF4-FFF2-40B4-BE49-F238E27FC236}">
-                <a16:creationId xmlns:a16="http://schemas.microsoft.com/office/drawing/2014/main" id="{B0D53827-1371-42AB-876E-71BB20903665}"/>
+                <a16:creationId xmlns:a16="http://schemas.microsoft.com/office/drawing/2014/main" id="{811CA3FE-22DA-433B-B3CB-F3E083767AAB}"/>
               </a:ext>
             </a:extLst>
           </p:cNvPr>
@@ -2198,7 +2204,7 @@
           <p:cNvPr id="6" name="Marcador de contenido 5">
             <a:extLst>
               <a:ext uri="{FF2B5EF4-FFF2-40B4-BE49-F238E27FC236}">
-                <a16:creationId xmlns:a16="http://schemas.microsoft.com/office/drawing/2014/main" id="{4DDC42E3-41C9-4C44-8CC9-1C1B72513FDE}"/>
+                <a16:creationId xmlns:a16="http://schemas.microsoft.com/office/drawing/2014/main" id="{9A8B8F02-8A0A-4121-8B58-A8C715433A66}"/>
               </a:ext>
             </a:extLst>
           </p:cNvPr>
@@ -2261,7 +2267,7 @@
           <p:cNvPr id="7" name="Marcador de fecha 6">
             <a:extLst>
               <a:ext uri="{FF2B5EF4-FFF2-40B4-BE49-F238E27FC236}">
-                <a16:creationId xmlns:a16="http://schemas.microsoft.com/office/drawing/2014/main" id="{6C39A8A7-3B3F-46C3-B27B-139601AB7D6E}"/>
+                <a16:creationId xmlns:a16="http://schemas.microsoft.com/office/drawing/2014/main" id="{08976385-B86B-4E85-AC67-A2B7D6CD5F90}"/>
               </a:ext>
             </a:extLst>
           </p:cNvPr>
@@ -2289,7 +2295,7 @@
           <p:cNvPr id="8" name="Marcador de pie de página 7">
             <a:extLst>
               <a:ext uri="{FF2B5EF4-FFF2-40B4-BE49-F238E27FC236}">
-                <a16:creationId xmlns:a16="http://schemas.microsoft.com/office/drawing/2014/main" id="{D5EAA716-C9ED-4331-A500-15A5DAEF6149}"/>
+                <a16:creationId xmlns:a16="http://schemas.microsoft.com/office/drawing/2014/main" id="{23D7C9D8-FF9B-4658-B8F4-1B5FAAF78166}"/>
               </a:ext>
             </a:extLst>
           </p:cNvPr>
@@ -2317,7 +2323,7 @@
           <p:cNvPr id="9" name="Marcador de número de diapositiva 8">
             <a:extLst>
               <a:ext uri="{FF2B5EF4-FFF2-40B4-BE49-F238E27FC236}">
-                <a16:creationId xmlns:a16="http://schemas.microsoft.com/office/drawing/2014/main" id="{BA2A7645-E6D6-4B2B-B313-81D12833C825}"/>
+                <a16:creationId xmlns:a16="http://schemas.microsoft.com/office/drawing/2014/main" id="{E0F6727E-AEB5-477F-82FA-57E37044FF8C}"/>
               </a:ext>
             </a:extLst>
           </p:cNvPr>
@@ -2344,7 +2350,7 @@
     </p:spTree>
     <p:extLst>
       <p:ext uri="{BB962C8B-B14F-4D97-AF65-F5344CB8AC3E}">
-        <p14:creationId xmlns:p14="http://schemas.microsoft.com/office/powerpoint/2010/main" val="3319458872"/>
+        <p14:creationId xmlns:p14="http://schemas.microsoft.com/office/powerpoint/2010/main" val="1779373036"/>
       </p:ext>
     </p:extLst>
   </p:cSld>
@@ -2376,7 +2382,7 @@
           <p:cNvPr id="2" name="Título 1">
             <a:extLst>
               <a:ext uri="{FF2B5EF4-FFF2-40B4-BE49-F238E27FC236}">
-                <a16:creationId xmlns:a16="http://schemas.microsoft.com/office/drawing/2014/main" id="{94CFE1FC-F50E-4634-A204-D40B9628AF45}"/>
+                <a16:creationId xmlns:a16="http://schemas.microsoft.com/office/drawing/2014/main" id="{C5AF25FA-4420-4521-9274-91ACE9DE055F}"/>
               </a:ext>
             </a:extLst>
           </p:cNvPr>
@@ -2405,7 +2411,7 @@
           <p:cNvPr id="3" name="Marcador de fecha 2">
             <a:extLst>
               <a:ext uri="{FF2B5EF4-FFF2-40B4-BE49-F238E27FC236}">
-                <a16:creationId xmlns:a16="http://schemas.microsoft.com/office/drawing/2014/main" id="{A11C831A-D358-49D2-93EA-3C132BDFEA59}"/>
+                <a16:creationId xmlns:a16="http://schemas.microsoft.com/office/drawing/2014/main" id="{CA1847F5-E885-4017-82A9-40941B76E7F6}"/>
               </a:ext>
             </a:extLst>
           </p:cNvPr>
@@ -2433,7 +2439,7 @@
           <p:cNvPr id="4" name="Marcador de pie de página 3">
             <a:extLst>
               <a:ext uri="{FF2B5EF4-FFF2-40B4-BE49-F238E27FC236}">
-                <a16:creationId xmlns:a16="http://schemas.microsoft.com/office/drawing/2014/main" id="{A8FEA2C1-E8F2-4A2F-B550-08C73D45EC4D}"/>
+                <a16:creationId xmlns:a16="http://schemas.microsoft.com/office/drawing/2014/main" id="{24B79AC2-7782-49F6-B2DA-7670CBED5317}"/>
               </a:ext>
             </a:extLst>
           </p:cNvPr>
@@ -2461,7 +2467,7 @@
           <p:cNvPr id="5" name="Marcador de número de diapositiva 4">
             <a:extLst>
               <a:ext uri="{FF2B5EF4-FFF2-40B4-BE49-F238E27FC236}">
-                <a16:creationId xmlns:a16="http://schemas.microsoft.com/office/drawing/2014/main" id="{12FF2FB5-811E-4012-9600-B4529E7A7FDF}"/>
+                <a16:creationId xmlns:a16="http://schemas.microsoft.com/office/drawing/2014/main" id="{049005AE-BA09-47F9-B4AB-02E23ACE2895}"/>
               </a:ext>
             </a:extLst>
           </p:cNvPr>
@@ -2488,7 +2494,7 @@
     </p:spTree>
     <p:extLst>
       <p:ext uri="{BB962C8B-B14F-4D97-AF65-F5344CB8AC3E}">
-        <p14:creationId xmlns:p14="http://schemas.microsoft.com/office/powerpoint/2010/main" val="2270319609"/>
+        <p14:creationId xmlns:p14="http://schemas.microsoft.com/office/powerpoint/2010/main" val="2396353430"/>
       </p:ext>
     </p:extLst>
   </p:cSld>
@@ -2520,7 +2526,7 @@
           <p:cNvPr id="2" name="Marcador de fecha 1">
             <a:extLst>
               <a:ext uri="{FF2B5EF4-FFF2-40B4-BE49-F238E27FC236}">
-                <a16:creationId xmlns:a16="http://schemas.microsoft.com/office/drawing/2014/main" id="{D5EC2B54-B1C0-4C21-A82E-E1849C2E1F80}"/>
+                <a16:creationId xmlns:a16="http://schemas.microsoft.com/office/drawing/2014/main" id="{A1796FE7-F3DB-4D11-AEDC-B2F046B2292C}"/>
               </a:ext>
             </a:extLst>
           </p:cNvPr>
@@ -2548,7 +2554,7 @@
           <p:cNvPr id="3" name="Marcador de pie de página 2">
             <a:extLst>
               <a:ext uri="{FF2B5EF4-FFF2-40B4-BE49-F238E27FC236}">
-                <a16:creationId xmlns:a16="http://schemas.microsoft.com/office/drawing/2014/main" id="{E00B93BC-DE13-4071-8235-F118701EFA32}"/>
+                <a16:creationId xmlns:a16="http://schemas.microsoft.com/office/drawing/2014/main" id="{17A191A4-2D96-4D19-94D6-0FA89EA92FC0}"/>
               </a:ext>
             </a:extLst>
           </p:cNvPr>
@@ -2576,7 +2582,7 @@
           <p:cNvPr id="4" name="Marcador de número de diapositiva 3">
             <a:extLst>
               <a:ext uri="{FF2B5EF4-FFF2-40B4-BE49-F238E27FC236}">
-                <a16:creationId xmlns:a16="http://schemas.microsoft.com/office/drawing/2014/main" id="{AD380D85-02E5-4621-9913-03105FD783FA}"/>
+                <a16:creationId xmlns:a16="http://schemas.microsoft.com/office/drawing/2014/main" id="{5F082111-EB5B-4C10-9B5E-3079E7A16EC2}"/>
               </a:ext>
             </a:extLst>
           </p:cNvPr>
@@ -2603,7 +2609,7 @@
     </p:spTree>
     <p:extLst>
       <p:ext uri="{BB962C8B-B14F-4D97-AF65-F5344CB8AC3E}">
-        <p14:creationId xmlns:p14="http://schemas.microsoft.com/office/powerpoint/2010/main" val="1824328752"/>
+        <p14:creationId xmlns:p14="http://schemas.microsoft.com/office/powerpoint/2010/main" val="2741881814"/>
       </p:ext>
     </p:extLst>
   </p:cSld>
@@ -2635,7 +2641,7 @@
           <p:cNvPr id="2" name="Título 1">
             <a:extLst>
               <a:ext uri="{FF2B5EF4-FFF2-40B4-BE49-F238E27FC236}">
-                <a16:creationId xmlns:a16="http://schemas.microsoft.com/office/drawing/2014/main" id="{F1BE09A5-C85E-4409-8DF3-45418F392B9E}"/>
+                <a16:creationId xmlns:a16="http://schemas.microsoft.com/office/drawing/2014/main" id="{6C717CCC-23B0-4104-A040-7B37C4F1827F}"/>
               </a:ext>
             </a:extLst>
           </p:cNvPr>
@@ -2673,7 +2679,7 @@
           <p:cNvPr id="3" name="Marcador de contenido 2">
             <a:extLst>
               <a:ext uri="{FF2B5EF4-FFF2-40B4-BE49-F238E27FC236}">
-                <a16:creationId xmlns:a16="http://schemas.microsoft.com/office/drawing/2014/main" id="{A8485951-73DE-4E24-ACD5-6E935D0C241F}"/>
+                <a16:creationId xmlns:a16="http://schemas.microsoft.com/office/drawing/2014/main" id="{FC5506A3-7665-4EC3-9DFA-CDE569DFEB99}"/>
               </a:ext>
             </a:extLst>
           </p:cNvPr>
@@ -2764,7 +2770,7 @@
           <p:cNvPr id="4" name="Marcador de texto 3">
             <a:extLst>
               <a:ext uri="{FF2B5EF4-FFF2-40B4-BE49-F238E27FC236}">
-                <a16:creationId xmlns:a16="http://schemas.microsoft.com/office/drawing/2014/main" id="{003E36C0-3073-4874-9429-AFCD698BF48A}"/>
+                <a16:creationId xmlns:a16="http://schemas.microsoft.com/office/drawing/2014/main" id="{A76BE9EA-55BD-4BD6-86D8-3F0076702E82}"/>
               </a:ext>
             </a:extLst>
           </p:cNvPr>
@@ -2835,7 +2841,7 @@
           <p:cNvPr id="5" name="Marcador de fecha 4">
             <a:extLst>
               <a:ext uri="{FF2B5EF4-FFF2-40B4-BE49-F238E27FC236}">
-                <a16:creationId xmlns:a16="http://schemas.microsoft.com/office/drawing/2014/main" id="{D8556628-8E68-4C6F-9EFF-97449BDD0CA4}"/>
+                <a16:creationId xmlns:a16="http://schemas.microsoft.com/office/drawing/2014/main" id="{01DD4F7E-C20B-49CC-81AF-3B9001F8063E}"/>
               </a:ext>
             </a:extLst>
           </p:cNvPr>
@@ -2863,7 +2869,7 @@
           <p:cNvPr id="6" name="Marcador de pie de página 5">
             <a:extLst>
               <a:ext uri="{FF2B5EF4-FFF2-40B4-BE49-F238E27FC236}">
-                <a16:creationId xmlns:a16="http://schemas.microsoft.com/office/drawing/2014/main" id="{D4B2C005-00B7-47D6-B87A-E6AA7F2B34C5}"/>
+                <a16:creationId xmlns:a16="http://schemas.microsoft.com/office/drawing/2014/main" id="{91295445-AD6D-4277-A117-E36C436853E1}"/>
               </a:ext>
             </a:extLst>
           </p:cNvPr>
@@ -2891,7 +2897,7 @@
           <p:cNvPr id="7" name="Marcador de número de diapositiva 6">
             <a:extLst>
               <a:ext uri="{FF2B5EF4-FFF2-40B4-BE49-F238E27FC236}">
-                <a16:creationId xmlns:a16="http://schemas.microsoft.com/office/drawing/2014/main" id="{B787EB47-3CBB-4973-BA7C-E81B1268C0B8}"/>
+                <a16:creationId xmlns:a16="http://schemas.microsoft.com/office/drawing/2014/main" id="{9B9BE42E-7358-475E-90D5-4F721372FF9F}"/>
               </a:ext>
             </a:extLst>
           </p:cNvPr>
@@ -2918,7 +2924,7 @@
     </p:spTree>
     <p:extLst>
       <p:ext uri="{BB962C8B-B14F-4D97-AF65-F5344CB8AC3E}">
-        <p14:creationId xmlns:p14="http://schemas.microsoft.com/office/powerpoint/2010/main" val="1921674215"/>
+        <p14:creationId xmlns:p14="http://schemas.microsoft.com/office/powerpoint/2010/main" val="695466558"/>
       </p:ext>
     </p:extLst>
   </p:cSld>
@@ -2950,7 +2956,7 @@
           <p:cNvPr id="2" name="Título 1">
             <a:extLst>
               <a:ext uri="{FF2B5EF4-FFF2-40B4-BE49-F238E27FC236}">
-                <a16:creationId xmlns:a16="http://schemas.microsoft.com/office/drawing/2014/main" id="{2241CA18-05EA-4A39-B63F-7768B79F7FB0}"/>
+                <a16:creationId xmlns:a16="http://schemas.microsoft.com/office/drawing/2014/main" id="{ECD58DD9-9B4E-4A74-AF12-A56CA7314C32}"/>
               </a:ext>
             </a:extLst>
           </p:cNvPr>
@@ -2988,7 +2994,7 @@
           <p:cNvPr id="3" name="Marcador de posición de imagen 2">
             <a:extLst>
               <a:ext uri="{FF2B5EF4-FFF2-40B4-BE49-F238E27FC236}">
-                <a16:creationId xmlns:a16="http://schemas.microsoft.com/office/drawing/2014/main" id="{890BBDA7-F479-4ED5-90EE-1A12284B0AEE}"/>
+                <a16:creationId xmlns:a16="http://schemas.microsoft.com/office/drawing/2014/main" id="{4518A54D-97C3-41A5-ACD4-C9E352B291D0}"/>
               </a:ext>
             </a:extLst>
           </p:cNvPr>
@@ -3055,7 +3061,7 @@
           <p:cNvPr id="4" name="Marcador de texto 3">
             <a:extLst>
               <a:ext uri="{FF2B5EF4-FFF2-40B4-BE49-F238E27FC236}">
-                <a16:creationId xmlns:a16="http://schemas.microsoft.com/office/drawing/2014/main" id="{AE9FD74B-280D-4997-B808-56592A2EA357}"/>
+                <a16:creationId xmlns:a16="http://schemas.microsoft.com/office/drawing/2014/main" id="{2DC95EA1-3DBD-4DD2-9D1C-F63A92974DCB}"/>
               </a:ext>
             </a:extLst>
           </p:cNvPr>
@@ -3126,7 +3132,7 @@
           <p:cNvPr id="5" name="Marcador de fecha 4">
             <a:extLst>
               <a:ext uri="{FF2B5EF4-FFF2-40B4-BE49-F238E27FC236}">
-                <a16:creationId xmlns:a16="http://schemas.microsoft.com/office/drawing/2014/main" id="{B1DCD977-864C-461D-AF64-66938D824BB8}"/>
+                <a16:creationId xmlns:a16="http://schemas.microsoft.com/office/drawing/2014/main" id="{8B515AEF-EF35-4D5A-8B26-5FD7CF225609}"/>
               </a:ext>
             </a:extLst>
           </p:cNvPr>
@@ -3154,7 +3160,7 @@
           <p:cNvPr id="6" name="Marcador de pie de página 5">
             <a:extLst>
               <a:ext uri="{FF2B5EF4-FFF2-40B4-BE49-F238E27FC236}">
-                <a16:creationId xmlns:a16="http://schemas.microsoft.com/office/drawing/2014/main" id="{599E1E3E-CB9E-4D77-8BC4-908AF8CC9E55}"/>
+                <a16:creationId xmlns:a16="http://schemas.microsoft.com/office/drawing/2014/main" id="{2D382DC7-E21A-48EE-ACE8-63ACA3282DBF}"/>
               </a:ext>
             </a:extLst>
           </p:cNvPr>
@@ -3182,7 +3188,7 @@
           <p:cNvPr id="7" name="Marcador de número de diapositiva 6">
             <a:extLst>
               <a:ext uri="{FF2B5EF4-FFF2-40B4-BE49-F238E27FC236}">
-                <a16:creationId xmlns:a16="http://schemas.microsoft.com/office/drawing/2014/main" id="{7F43A004-9498-4CD3-9A44-5BBE89E9C321}"/>
+                <a16:creationId xmlns:a16="http://schemas.microsoft.com/office/drawing/2014/main" id="{1E64CC97-0733-4F5C-984D-A94658C92B57}"/>
               </a:ext>
             </a:extLst>
           </p:cNvPr>
@@ -3209,7 +3215,7 @@
     </p:spTree>
     <p:extLst>
       <p:ext uri="{BB962C8B-B14F-4D97-AF65-F5344CB8AC3E}">
-        <p14:creationId xmlns:p14="http://schemas.microsoft.com/office/powerpoint/2010/main" val="1292789777"/>
+        <p14:creationId xmlns:p14="http://schemas.microsoft.com/office/powerpoint/2010/main" val="731566636"/>
       </p:ext>
     </p:extLst>
   </p:cSld>
@@ -3246,7 +3252,7 @@
           <p:cNvPr id="2" name="Marcador de título 1">
             <a:extLst>
               <a:ext uri="{FF2B5EF4-FFF2-40B4-BE49-F238E27FC236}">
-                <a16:creationId xmlns:a16="http://schemas.microsoft.com/office/drawing/2014/main" id="{24A28DD4-328E-45D0-9474-7A63A1915861}"/>
+                <a16:creationId xmlns:a16="http://schemas.microsoft.com/office/drawing/2014/main" id="{7AB6052B-E268-49B1-85E8-D56FBACF6AB7}"/>
               </a:ext>
             </a:extLst>
           </p:cNvPr>
@@ -3285,7 +3291,7 @@
           <p:cNvPr id="3" name="Marcador de texto 2">
             <a:extLst>
               <a:ext uri="{FF2B5EF4-FFF2-40B4-BE49-F238E27FC236}">
-                <a16:creationId xmlns:a16="http://schemas.microsoft.com/office/drawing/2014/main" id="{AB92BD97-8447-412B-B9AF-CDC16CF819FC}"/>
+                <a16:creationId xmlns:a16="http://schemas.microsoft.com/office/drawing/2014/main" id="{11E01654-20A1-4619-A402-876727D4BC81}"/>
               </a:ext>
             </a:extLst>
           </p:cNvPr>
@@ -3353,7 +3359,7 @@
           <p:cNvPr id="4" name="Marcador de fecha 3">
             <a:extLst>
               <a:ext uri="{FF2B5EF4-FFF2-40B4-BE49-F238E27FC236}">
-                <a16:creationId xmlns:a16="http://schemas.microsoft.com/office/drawing/2014/main" id="{165DD3B4-FC33-4C82-9E2E-2537392E3DF1}"/>
+                <a16:creationId xmlns:a16="http://schemas.microsoft.com/office/drawing/2014/main" id="{9BD68779-C634-4F22-B878-D34C46F80620}"/>
               </a:ext>
             </a:extLst>
           </p:cNvPr>
@@ -3399,7 +3405,7 @@
           <p:cNvPr id="5" name="Marcador de pie de página 4">
             <a:extLst>
               <a:ext uri="{FF2B5EF4-FFF2-40B4-BE49-F238E27FC236}">
-                <a16:creationId xmlns:a16="http://schemas.microsoft.com/office/drawing/2014/main" id="{9B2BB0D6-045D-459B-896B-844D208CDAEF}"/>
+                <a16:creationId xmlns:a16="http://schemas.microsoft.com/office/drawing/2014/main" id="{29B9A46F-5934-4D88-8D72-4405029C191C}"/>
               </a:ext>
             </a:extLst>
           </p:cNvPr>
@@ -3445,7 +3451,7 @@
           <p:cNvPr id="6" name="Marcador de número de diapositiva 5">
             <a:extLst>
               <a:ext uri="{FF2B5EF4-FFF2-40B4-BE49-F238E27FC236}">
-                <a16:creationId xmlns:a16="http://schemas.microsoft.com/office/drawing/2014/main" id="{D389C8D7-F901-44FB-8012-89BBA1453878}"/>
+                <a16:creationId xmlns:a16="http://schemas.microsoft.com/office/drawing/2014/main" id="{EC51025F-1187-4BC2-B812-0CE0B907FCB9}"/>
               </a:ext>
             </a:extLst>
           </p:cNvPr>
@@ -3490,23 +3496,23 @@
     </p:spTree>
     <p:extLst>
       <p:ext uri="{BB962C8B-B14F-4D97-AF65-F5344CB8AC3E}">
-        <p14:creationId xmlns:p14="http://schemas.microsoft.com/office/powerpoint/2010/main" val="1824008798"/>
+        <p14:creationId xmlns:p14="http://schemas.microsoft.com/office/powerpoint/2010/main" val="3339598595"/>
       </p:ext>
     </p:extLst>
   </p:cSld>
   <p:clrMap bg1="lt1" tx1="dk1" bg2="lt2" tx2="dk2" accent1="accent1" accent2="accent2" accent3="accent3" accent4="accent4" accent5="accent5" accent6="accent6" hlink="hlink" folHlink="folHlink"/>
   <p:sldLayoutIdLst>
-    <p:sldLayoutId id="2147483649" r:id="rId1"/>
-    <p:sldLayoutId id="2147483650" r:id="rId2"/>
-    <p:sldLayoutId id="2147483651" r:id="rId3"/>
-    <p:sldLayoutId id="2147483652" r:id="rId4"/>
-    <p:sldLayoutId id="2147483653" r:id="rId5"/>
-    <p:sldLayoutId id="2147483654" r:id="rId6"/>
-    <p:sldLayoutId id="2147483655" r:id="rId7"/>
-    <p:sldLayoutId id="2147483656" r:id="rId8"/>
-    <p:sldLayoutId id="2147483657" r:id="rId9"/>
-    <p:sldLayoutId id="2147483658" r:id="rId10"/>
-    <p:sldLayoutId id="2147483659" r:id="rId11"/>
+    <p:sldLayoutId id="2147483679" r:id="rId1"/>
+    <p:sldLayoutId id="2147483680" r:id="rId2"/>
+    <p:sldLayoutId id="2147483681" r:id="rId3"/>
+    <p:sldLayoutId id="2147483682" r:id="rId4"/>
+    <p:sldLayoutId id="2147483683" r:id="rId5"/>
+    <p:sldLayoutId id="2147483684" r:id="rId6"/>
+    <p:sldLayoutId id="2147483685" r:id="rId7"/>
+    <p:sldLayoutId id="2147483686" r:id="rId8"/>
+    <p:sldLayoutId id="2147483687" r:id="rId9"/>
+    <p:sldLayoutId id="2147483688" r:id="rId10"/>
+    <p:sldLayoutId id="2147483689" r:id="rId11"/>
   </p:sldLayoutIdLst>
   <p:hf hdr="0"/>
   <p:txStyles>
@@ -3795,6 +3801,218 @@
 <file path=ppt/slides/slide1.xml><?xml version="1.0" encoding="utf-8"?>
 <p:sld xmlns:a="http://schemas.openxmlformats.org/drawingml/2006/main" xmlns:r="http://schemas.openxmlformats.org/officeDocument/2006/relationships" xmlns:p="http://schemas.openxmlformats.org/presentationml/2006/main">
   <p:cSld>
+    <p:bg>
+      <p:bgPr>
+        <a:blipFill>
+          <a:blip r:embed="rId2"/>
+          <a:tile tx="0" ty="0" sx="100000" sy="100000" flip="none" algn="tl"/>
+        </a:blipFill>
+        <a:effectLst/>
+      </p:bgPr>
+    </p:bg>
+    <p:spTree>
+      <p:nvGrpSpPr>
+        <p:cNvPr id="1" name=""/>
+        <p:cNvGrpSpPr/>
+        <p:nvPr/>
+      </p:nvGrpSpPr>
+      <p:grpSpPr>
+        <a:xfrm>
+          <a:off x="0" y="0"/>
+          <a:ext cx="0" cy="0"/>
+          <a:chOff x="0" y="0"/>
+          <a:chExt cx="0" cy="0"/>
+        </a:xfrm>
+      </p:grpSpPr>
+      <p:sp>
+        <p:nvSpPr>
+          <p:cNvPr id="2" name="Título 1">
+            <a:extLst>
+              <a:ext uri="{FF2B5EF4-FFF2-40B4-BE49-F238E27FC236}">
+                <a16:creationId xmlns:a16="http://schemas.microsoft.com/office/drawing/2014/main" id="{67F8F8BC-1408-4DA5-9CE8-5219350375BF}"/>
+              </a:ext>
+            </a:extLst>
+          </p:cNvPr>
+          <p:cNvSpPr>
+            <a:spLocks noGrp="1"/>
+          </p:cNvSpPr>
+          <p:nvPr>
+            <p:ph type="ctrTitle"/>
+          </p:nvPr>
+        </p:nvSpPr>
+        <p:spPr>
+          <a:xfrm>
+            <a:off x="1524000" y="2539999"/>
+            <a:ext cx="9144000" cy="969963"/>
+          </a:xfrm>
+          <a:solidFill>
+            <a:schemeClr val="bg1"/>
+          </a:solidFill>
+          <a:ln>
+            <a:solidFill>
+              <a:schemeClr val="tx1">
+                <a:lumMod val="65000"/>
+                <a:lumOff val="35000"/>
+              </a:schemeClr>
+            </a:solidFill>
+          </a:ln>
+        </p:spPr>
+        <p:txBody>
+          <a:bodyPr/>
+          <a:lstStyle/>
+          <a:p>
+            <a:r>
+              <a:rPr lang="es-MX" dirty="0"/>
+              <a:t>Autómata Finito</a:t>
+            </a:r>
+          </a:p>
+        </p:txBody>
+      </p:sp>
+      <p:sp>
+        <p:nvSpPr>
+          <p:cNvPr id="3" name="Subtítulo 2">
+            <a:extLst>
+              <a:ext uri="{FF2B5EF4-FFF2-40B4-BE49-F238E27FC236}">
+                <a16:creationId xmlns:a16="http://schemas.microsoft.com/office/drawing/2014/main" id="{D3DBD925-36F8-4E3E-AE7A-5673D17912A9}"/>
+              </a:ext>
+            </a:extLst>
+          </p:cNvPr>
+          <p:cNvSpPr>
+            <a:spLocks noGrp="1"/>
+          </p:cNvSpPr>
+          <p:nvPr>
+            <p:ph type="subTitle" idx="1"/>
+          </p:nvPr>
+        </p:nvSpPr>
+        <p:spPr>
+          <a:xfrm>
+            <a:off x="4724400" y="3767138"/>
+            <a:ext cx="2743200" cy="538162"/>
+          </a:xfrm>
+          <a:solidFill>
+            <a:schemeClr val="bg1"/>
+          </a:solidFill>
+          <a:ln>
+            <a:solidFill>
+              <a:schemeClr val="tx1">
+                <a:lumMod val="65000"/>
+                <a:lumOff val="35000"/>
+              </a:schemeClr>
+            </a:solidFill>
+          </a:ln>
+        </p:spPr>
+        <p:txBody>
+          <a:bodyPr/>
+          <a:lstStyle/>
+          <a:p>
+            <a:r>
+              <a:rPr lang="es-MX" dirty="0"/>
+              <a:t>Estructura Switch()</a:t>
+            </a:r>
+          </a:p>
+        </p:txBody>
+      </p:sp>
+      <p:sp>
+        <p:nvSpPr>
+          <p:cNvPr id="4" name="Marcador de fecha 3">
+            <a:extLst>
+              <a:ext uri="{FF2B5EF4-FFF2-40B4-BE49-F238E27FC236}">
+                <a16:creationId xmlns:a16="http://schemas.microsoft.com/office/drawing/2014/main" id="{E3E6F05F-F854-49AA-AC9F-2091C319053F}"/>
+              </a:ext>
+            </a:extLst>
+          </p:cNvPr>
+          <p:cNvSpPr>
+            <a:spLocks noGrp="1"/>
+          </p:cNvSpPr>
+          <p:nvPr>
+            <p:ph type="dt" sz="half" idx="10"/>
+          </p:nvPr>
+        </p:nvSpPr>
+        <p:spPr/>
+        <p:txBody>
+          <a:bodyPr/>
+          <a:lstStyle/>
+          <a:p>
+            <a:r>
+              <a:rPr lang="es-MX" dirty="0"/>
+              <a:t>02/02/2018</a:t>
+            </a:r>
+          </a:p>
+        </p:txBody>
+      </p:sp>
+      <p:sp>
+        <p:nvSpPr>
+          <p:cNvPr id="5" name="Marcador de pie de página 4">
+            <a:extLst>
+              <a:ext uri="{FF2B5EF4-FFF2-40B4-BE49-F238E27FC236}">
+                <a16:creationId xmlns:a16="http://schemas.microsoft.com/office/drawing/2014/main" id="{66250194-2210-4E56-86CF-B5D53FCEF157}"/>
+              </a:ext>
+            </a:extLst>
+          </p:cNvPr>
+          <p:cNvSpPr>
+            <a:spLocks noGrp="1"/>
+          </p:cNvSpPr>
+          <p:nvPr>
+            <p:ph type="ftr" sz="quarter" idx="11"/>
+          </p:nvPr>
+        </p:nvSpPr>
+        <p:spPr/>
+        <p:txBody>
+          <a:bodyPr/>
+          <a:lstStyle/>
+          <a:p>
+            <a:r>
+              <a:rPr lang="es-MX"/>
+              <a:t>Hecho por: Luis Fernando Hernández Morales  5º "A"</a:t>
+            </a:r>
+          </a:p>
+        </p:txBody>
+      </p:sp>
+      <p:sp>
+        <p:nvSpPr>
+          <p:cNvPr id="6" name="Marcador de número de diapositiva 5">
+            <a:extLst>
+              <a:ext uri="{FF2B5EF4-FFF2-40B4-BE49-F238E27FC236}">
+                <a16:creationId xmlns:a16="http://schemas.microsoft.com/office/drawing/2014/main" id="{AF1E32A4-9630-4A78-B08C-2473A5B76B25}"/>
+              </a:ext>
+            </a:extLst>
+          </p:cNvPr>
+          <p:cNvSpPr>
+            <a:spLocks noGrp="1"/>
+          </p:cNvSpPr>
+          <p:nvPr>
+            <p:ph type="sldNum" sz="quarter" idx="12"/>
+          </p:nvPr>
+        </p:nvSpPr>
+        <p:spPr/>
+        <p:txBody>
+          <a:bodyPr/>
+          <a:lstStyle/>
+          <a:p>
+            <a:fld id="{44B88DFD-5E86-42E0-A522-7502C92F968C}" type="slidenum">
+              <a:rPr lang="es-MX" smtClean="0"/>
+              <a:t>1</a:t>
+            </a:fld>
+            <a:endParaRPr lang="es-MX"/>
+          </a:p>
+        </p:txBody>
+      </p:sp>
+    </p:spTree>
+    <p:extLst>
+      <p:ext uri="{BB962C8B-B14F-4D97-AF65-F5344CB8AC3E}">
+        <p14:creationId xmlns:p14="http://schemas.microsoft.com/office/powerpoint/2010/main" val="3160002042"/>
+      </p:ext>
+    </p:extLst>
+  </p:cSld>
+  <p:clrMapOvr>
+    <a:masterClrMapping/>
+  </p:clrMapOvr>
+</p:sld>
+</file>
+
+<file path=ppt/slides/slide2.xml><?xml version="1.0" encoding="utf-8"?>
+<p:sld xmlns:a="http://schemas.openxmlformats.org/drawingml/2006/main" xmlns:r="http://schemas.openxmlformats.org/officeDocument/2006/relationships" xmlns:p="http://schemas.openxmlformats.org/presentationml/2006/main" showMasterSp="0">
+  <p:cSld>
     <p:spTree>
       <p:nvGrpSpPr>
         <p:cNvPr id="1" name=""/>
@@ -4681,7 +4899,7 @@
         </p:nvSpPr>
         <p:spPr>
           <a:xfrm rot="19038677">
-            <a:off x="3729783" y="2178753"/>
+            <a:off x="3716894" y="2123825"/>
             <a:ext cx="230731" cy="276999"/>
           </a:xfrm>
           <a:prstGeom prst="rect">
@@ -5991,13 +6209,14 @@
           <p:cNvCxnSpPr>
             <a:cxnSpLocks/>
             <a:stCxn id="76" idx="4"/>
+            <a:endCxn id="81" idx="0"/>
           </p:cNvCxnSpPr>
           <p:nvPr/>
         </p:nvCxnSpPr>
         <p:spPr>
-          <a:xfrm flipH="1">
-            <a:off x="11231328" y="4010618"/>
-            <a:ext cx="1" cy="411323"/>
+          <a:xfrm>
+            <a:off x="11231329" y="4010618"/>
+            <a:ext cx="0" cy="396295"/>
           </a:xfrm>
           <a:prstGeom prst="straightConnector1">
             <a:avLst/>
@@ -6035,7 +6254,7 @@
         </p:nvSpPr>
         <p:spPr>
           <a:xfrm>
-            <a:off x="11224579" y="4010618"/>
+            <a:off x="11224578" y="4051733"/>
             <a:ext cx="650049" cy="276999"/>
           </a:xfrm>
           <a:prstGeom prst="rect">
@@ -6071,7 +6290,7 @@
         </p:nvSpPr>
         <p:spPr>
           <a:xfrm>
-            <a:off x="10853873" y="4315472"/>
+            <a:off x="10853873" y="4406913"/>
             <a:ext cx="754911" cy="691098"/>
           </a:xfrm>
           <a:prstGeom prst="ellipse">
@@ -6142,8 +6361,8 @@
         </p:nvCxnSpPr>
         <p:spPr>
           <a:xfrm rot="10800000">
-            <a:off x="6269347" y="1783953"/>
-            <a:ext cx="4584526" cy="2877069"/>
+            <a:off x="6269347" y="1783952"/>
+            <a:ext cx="4584526" cy="2968510"/>
           </a:xfrm>
           <a:prstGeom prst="curvedConnector2">
             <a:avLst/>
@@ -6185,7 +6404,7 @@
         </p:nvCxnSpPr>
         <p:spPr>
           <a:xfrm flipH="1">
-            <a:off x="11230929" y="5006570"/>
+            <a:off x="11230929" y="5098011"/>
             <a:ext cx="400" cy="387331"/>
           </a:xfrm>
           <a:prstGeom prst="straightConnector1">
@@ -6224,7 +6443,7 @@
         </p:nvSpPr>
         <p:spPr>
           <a:xfrm>
-            <a:off x="10911011" y="4979883"/>
+            <a:off x="10911011" y="5110513"/>
             <a:ext cx="230731" cy="276999"/>
           </a:xfrm>
           <a:prstGeom prst="rect">
@@ -6260,7 +6479,7 @@
         </p:nvSpPr>
         <p:spPr>
           <a:xfrm>
-            <a:off x="9714332" y="5379450"/>
+            <a:off x="9714332" y="5470891"/>
             <a:ext cx="720000" cy="720000"/>
           </a:xfrm>
           <a:prstGeom prst="ellipse">
@@ -6311,7 +6530,7 @@
         </p:nvSpPr>
         <p:spPr>
           <a:xfrm>
-            <a:off x="9747977" y="5421123"/>
+            <a:off x="9747977" y="5512564"/>
             <a:ext cx="648000" cy="648000"/>
           </a:xfrm>
           <a:prstGeom prst="ellipse">
@@ -6354,7 +6573,7 @@
                   <a:schemeClr val="tx1"/>
                 </a:solidFill>
               </a:rPr>
-              <a:t>18</a:t>
+              <a:t>16</a:t>
             </a:r>
             <a:endParaRPr lang="es-MX" sz="1600" dirty="0">
               <a:solidFill>
@@ -6715,8 +6934,8 @@
         </p:nvSpPr>
         <p:spPr>
           <a:xfrm>
-            <a:off x="453295" y="3504007"/>
-            <a:ext cx="3988400" cy="2585323"/>
+            <a:off x="1246713" y="3357923"/>
+            <a:ext cx="4467620" cy="2585323"/>
           </a:xfrm>
           <a:prstGeom prst="rect">
             <a:avLst/>
@@ -6746,7 +6965,7 @@
           <a:p>
             <a:r>
               <a:rPr lang="es-MX" b="1" dirty="0"/>
-              <a:t>Autómata para la estructura “SWITCH”</a:t>
+              <a:t>Autómata Finito para la estructura “SWITCH”</a:t>
             </a:r>
           </a:p>
           <a:p>
@@ -6863,7 +7082,7 @@
           <a:p>
             <a:r>
               <a:rPr lang="es-MX" dirty="0"/>
-              <a:t>31/01/2018</a:t>
+              <a:t>02/02/2018</a:t>
             </a:r>
           </a:p>
         </p:txBody>
@@ -6928,7 +7147,7 @@
           <a:p>
             <a:fld id="{44B88DFD-5E86-42E0-A522-7502C92F968C}" type="slidenum">
               <a:rPr lang="es-MX" smtClean="0"/>
-              <a:t>1</a:t>
+              <a:t>2</a:t>
             </a:fld>
             <a:endParaRPr lang="es-MX"/>
           </a:p>
@@ -7094,7 +7313,7 @@
         </p:nvSpPr>
         <p:spPr>
           <a:xfrm>
-            <a:off x="10853473" y="5393901"/>
+            <a:off x="10853473" y="5485342"/>
             <a:ext cx="754911" cy="691098"/>
           </a:xfrm>
           <a:prstGeom prst="ellipse">
@@ -7137,7 +7356,7 @@
                   <a:schemeClr val="tx1"/>
                 </a:solidFill>
               </a:rPr>
-              <a:t>17</a:t>
+              <a:t>15</a:t>
             </a:r>
             <a:endParaRPr lang="es-MX" dirty="0">
               <a:solidFill>
@@ -7161,8 +7380,8 @@
         </p:nvSpPr>
         <p:spPr>
           <a:xfrm>
-            <a:off x="10524236" y="5786986"/>
-            <a:ext cx="320464" cy="307777"/>
+            <a:off x="10499544" y="5912824"/>
+            <a:ext cx="410367" cy="307777"/>
           </a:xfrm>
           <a:prstGeom prst="rect">
             <a:avLst/>
@@ -7177,7 +7396,7 @@
           <a:p>
             <a:r>
               <a:rPr lang="es-MX" sz="1400" dirty="0"/>
-              <a:t>}</a:t>
+              <a:t>%}</a:t>
             </a:r>
             <a:endParaRPr lang="es-MX" dirty="0"/>
           </a:p>
@@ -7200,7 +7419,7 @@
         </p:nvCxnSpPr>
         <p:spPr>
           <a:xfrm flipH="1">
-            <a:off x="10443105" y="5739450"/>
+            <a:off x="10443105" y="5830891"/>
             <a:ext cx="410368" cy="147"/>
           </a:xfrm>
           <a:prstGeom prst="straightConnector1">
@@ -7265,6 +7484,227 @@
     <p:extLst>
       <p:ext uri="{BB962C8B-B14F-4D97-AF65-F5344CB8AC3E}">
         <p14:creationId xmlns:p14="http://schemas.microsoft.com/office/powerpoint/2010/main" val="3916955755"/>
+      </p:ext>
+    </p:extLst>
+  </p:cSld>
+  <p:clrMapOvr>
+    <a:masterClrMapping/>
+  </p:clrMapOvr>
+</p:sld>
+</file>
+
+<file path=ppt/slides/slide3.xml><?xml version="1.0" encoding="utf-8"?>
+<p:sld xmlns:a="http://schemas.openxmlformats.org/drawingml/2006/main" xmlns:r="http://schemas.openxmlformats.org/officeDocument/2006/relationships" xmlns:p="http://schemas.openxmlformats.org/presentationml/2006/main">
+  <p:cSld>
+    <p:spTree>
+      <p:nvGrpSpPr>
+        <p:cNvPr id="1" name=""/>
+        <p:cNvGrpSpPr/>
+        <p:nvPr/>
+      </p:nvGrpSpPr>
+      <p:grpSpPr>
+        <a:xfrm>
+          <a:off x="0" y="0"/>
+          <a:ext cx="0" cy="0"/>
+          <a:chOff x="0" y="0"/>
+          <a:chExt cx="0" cy="0"/>
+        </a:xfrm>
+      </p:grpSpPr>
+      <p:sp>
+        <p:nvSpPr>
+          <p:cNvPr id="4" name="Marcador de fecha 3">
+            <a:extLst>
+              <a:ext uri="{FF2B5EF4-FFF2-40B4-BE49-F238E27FC236}">
+                <a16:creationId xmlns:a16="http://schemas.microsoft.com/office/drawing/2014/main" id="{98465DE8-F5A2-48FE-A659-DEAA38394E84}"/>
+              </a:ext>
+            </a:extLst>
+          </p:cNvPr>
+          <p:cNvSpPr>
+            <a:spLocks noGrp="1"/>
+          </p:cNvSpPr>
+          <p:nvPr>
+            <p:ph type="dt" sz="half" idx="10"/>
+          </p:nvPr>
+        </p:nvSpPr>
+        <p:spPr/>
+        <p:txBody>
+          <a:bodyPr/>
+          <a:lstStyle/>
+          <a:p>
+            <a:r>
+              <a:rPr lang="es-MX" dirty="0"/>
+              <a:t>02/02/2018</a:t>
+            </a:r>
+          </a:p>
+        </p:txBody>
+      </p:sp>
+      <p:sp>
+        <p:nvSpPr>
+          <p:cNvPr id="5" name="Marcador de pie de página 4">
+            <a:extLst>
+              <a:ext uri="{FF2B5EF4-FFF2-40B4-BE49-F238E27FC236}">
+                <a16:creationId xmlns:a16="http://schemas.microsoft.com/office/drawing/2014/main" id="{F0D12B13-9840-41BF-AC55-29A6BD3F48E1}"/>
+              </a:ext>
+            </a:extLst>
+          </p:cNvPr>
+          <p:cNvSpPr>
+            <a:spLocks noGrp="1"/>
+          </p:cNvSpPr>
+          <p:nvPr>
+            <p:ph type="ftr" sz="quarter" idx="11"/>
+          </p:nvPr>
+        </p:nvSpPr>
+        <p:spPr/>
+        <p:txBody>
+          <a:bodyPr/>
+          <a:lstStyle/>
+          <a:p>
+            <a:r>
+              <a:rPr lang="es-MX" dirty="0"/>
+              <a:t>Hecho por: David Pérez S.  5º "A"</a:t>
+            </a:r>
+          </a:p>
+        </p:txBody>
+      </p:sp>
+      <p:sp>
+        <p:nvSpPr>
+          <p:cNvPr id="6" name="Marcador de número de diapositiva 5">
+            <a:extLst>
+              <a:ext uri="{FF2B5EF4-FFF2-40B4-BE49-F238E27FC236}">
+                <a16:creationId xmlns:a16="http://schemas.microsoft.com/office/drawing/2014/main" id="{98435FB2-BF6D-4168-A4F2-A6966C8F94D9}"/>
+              </a:ext>
+            </a:extLst>
+          </p:cNvPr>
+          <p:cNvSpPr>
+            <a:spLocks noGrp="1"/>
+          </p:cNvSpPr>
+          <p:nvPr>
+            <p:ph type="sldNum" sz="quarter" idx="12"/>
+          </p:nvPr>
+        </p:nvSpPr>
+        <p:spPr/>
+        <p:txBody>
+          <a:bodyPr/>
+          <a:lstStyle/>
+          <a:p>
+            <a:fld id="{44B88DFD-5E86-42E0-A522-7502C92F968C}" type="slidenum">
+              <a:rPr lang="es-MX" smtClean="0"/>
+              <a:t>3</a:t>
+            </a:fld>
+            <a:endParaRPr lang="es-MX"/>
+          </a:p>
+        </p:txBody>
+      </p:sp>
+      <p:sp>
+        <p:nvSpPr>
+          <p:cNvPr id="8" name="CuadroTexto 7">
+            <a:extLst>
+              <a:ext uri="{FF2B5EF4-FFF2-40B4-BE49-F238E27FC236}">
+                <a16:creationId xmlns:a16="http://schemas.microsoft.com/office/drawing/2014/main" id="{114B66F9-B181-4FAD-9F17-FB634368DDFF}"/>
+              </a:ext>
+            </a:extLst>
+          </p:cNvPr>
+          <p:cNvSpPr txBox="1"/>
+          <p:nvPr/>
+        </p:nvSpPr>
+        <p:spPr>
+          <a:xfrm>
+            <a:off x="1409700" y="1117600"/>
+            <a:ext cx="8534400" cy="2862322"/>
+          </a:xfrm>
+          <a:prstGeom prst="rect">
+            <a:avLst/>
+          </a:prstGeom>
+          <a:noFill/>
+        </p:spPr>
+        <p:txBody>
+          <a:bodyPr wrap="square" rtlCol="0">
+            <a:spAutoFit/>
+          </a:bodyPr>
+          <a:lstStyle/>
+          <a:p>
+            <a:r>
+              <a:rPr lang="es-MX" sz="2000" b="1" dirty="0"/>
+              <a:t>Elementos</a:t>
+            </a:r>
+          </a:p>
+          <a:p>
+            <a:endParaRPr lang="es-MX" sz="2000" b="1" dirty="0"/>
+          </a:p>
+          <a:p>
+            <a:r>
+              <a:rPr lang="es-MX" sz="2000" dirty="0"/>
+              <a:t>M= &lt; Q, Ʃ, q0, F, S &gt;</a:t>
+            </a:r>
+          </a:p>
+          <a:p>
+            <a:endParaRPr lang="es-MX" sz="2000" dirty="0"/>
+          </a:p>
+          <a:p>
+            <a:pPr marL="342900" indent="-342900">
+              <a:buFont typeface="Arial" panose="020B0604020202020204" pitchFamily="34" charset="0"/>
+              <a:buChar char="•"/>
+            </a:pPr>
+            <a:r>
+              <a:rPr lang="es-MX" sz="2000" dirty="0"/>
+              <a:t>Q= q0, q1, q2, q3, q4, q5, q6, q7, q8, q9, q10, q11, q12, q13, q14, q15, q16.</a:t>
+            </a:r>
+          </a:p>
+          <a:p>
+            <a:pPr marL="342900" indent="-342900">
+              <a:buFont typeface="Arial" panose="020B0604020202020204" pitchFamily="34" charset="0"/>
+              <a:buChar char="•"/>
+            </a:pPr>
+            <a:r>
+              <a:rPr lang="es-MX" sz="2000" dirty="0"/>
+              <a:t>Ʃ= { </a:t>
+            </a:r>
+            <a:r>
+              <a:rPr lang="en-US" dirty="0"/>
+              <a:t>Switch(#, #){%, %}, 0…9, a…z, A…Z, case#, #:, print(“, “), ;break;, e</a:t>
+            </a:r>
+            <a:r>
+              <a:rPr lang="es-MX" sz="2000" dirty="0"/>
+              <a:t> }.</a:t>
+            </a:r>
+          </a:p>
+          <a:p>
+            <a:pPr marL="342900" indent="-342900">
+              <a:buFont typeface="Arial" panose="020B0604020202020204" pitchFamily="34" charset="0"/>
+              <a:buChar char="•"/>
+            </a:pPr>
+            <a:r>
+              <a:rPr lang="es-MX" sz="2000" dirty="0"/>
+              <a:t>q0= q0.</a:t>
+            </a:r>
+          </a:p>
+          <a:p>
+            <a:pPr marL="342900" indent="-342900">
+              <a:buFont typeface="Arial" panose="020B0604020202020204" pitchFamily="34" charset="0"/>
+              <a:buChar char="•"/>
+            </a:pPr>
+            <a:r>
+              <a:rPr lang="es-MX" sz="2000" dirty="0"/>
+              <a:t>F= q16.</a:t>
+            </a:r>
+          </a:p>
+          <a:p>
+            <a:r>
+              <a:rPr lang="es-MX" sz="2000" dirty="0"/>
+              <a:t>S= [ </a:t>
+            </a:r>
+            <a:r>
+              <a:rPr lang="es-MX" dirty="0"/>
+              <a:t>El conjunto de todas las transiciones especificadas arriba ].</a:t>
+            </a:r>
+            <a:endParaRPr lang="es-MX" sz="2000" dirty="0"/>
+          </a:p>
+        </p:txBody>
+      </p:sp>
+    </p:spTree>
+    <p:extLst>
+      <p:ext uri="{BB962C8B-B14F-4D97-AF65-F5344CB8AC3E}">
+        <p14:creationId xmlns:p14="http://schemas.microsoft.com/office/powerpoint/2010/main" val="3270755821"/>
       </p:ext>
     </p:extLst>
   </p:cSld>

</xml_diff>